<commit_message>
a bit more update
</commit_message>
<xml_diff>
--- a/libs/spirit/doc/cppnow_2013/Inside Spirit X3.pptx
+++ b/libs/spirit/doc/cppnow_2013/Inside Spirit X3.pptx
@@ -663,7 +663,7 @@
             <a:fld id="{81331B57-0BE5-4F82-AA58-76F53EFF3ADA}" type="datetime8">
               <a:rPr lang="en-US" smtClean="0"/>
               <a:pPr/>
-              <a:t>5/15/2013 11:25 AM</a:t>
+              <a:t>5/15/2013 8:20 PM</a:t>
             </a:fld>
             <a:endParaRPr lang="en-US" dirty="0"/>
           </a:p>
@@ -1118,7 +1118,7 @@
             <a:fld id="{81331B57-0BE5-4F82-AA58-76F53EFF3ADA}" type="datetime8">
               <a:rPr lang="en-US" smtClean="0"/>
               <a:pPr/>
-              <a:t>5/15/2013 11:25 AM</a:t>
+              <a:t>5/15/2013 8:20 PM</a:t>
             </a:fld>
             <a:endParaRPr lang="en-US"/>
           </a:p>
@@ -5722,11 +5722,7 @@
           <a:p>
             <a:r>
               <a:rPr lang="en-US" sz="3600" dirty="0" smtClean="0"/>
-              <a:t>factor </a:t>
-            </a:r>
-            <a:r>
-              <a:rPr lang="en-US" sz="3600" dirty="0" smtClean="0"/>
-              <a:t>	←	integer   /    ‘(‘    </a:t>
+              <a:t>factor 	←	integer   /    ‘(‘    </a:t>
             </a:r>
             <a:r>
               <a:rPr lang="en-US" sz="3600" dirty="0" err="1" smtClean="0"/>
@@ -9706,11 +9702,7 @@
           <a:p>
             <a:r>
               <a:rPr lang="en-US" sz="3600" dirty="0" smtClean="0"/>
-              <a:t>factor </a:t>
-            </a:r>
-            <a:r>
-              <a:rPr lang="en-US" sz="3600" dirty="0" smtClean="0"/>
-              <a:t>	←	integer   /    ‘(‘    </a:t>
+              <a:t>factor 	←	integer   /    ‘(‘    </a:t>
             </a:r>
             <a:r>
               <a:rPr lang="en-US" sz="3600" dirty="0" err="1" smtClean="0"/>
@@ -12811,11 +12803,7 @@
             </a:pPr>
             <a:r>
               <a:rPr lang="en-US" dirty="0" smtClean="0"/>
-              <a:t>template </a:t>
-            </a:r>
-            <a:r>
-              <a:rPr lang="en-US" dirty="0" smtClean="0"/>
-              <a:t>&lt;</a:t>
+              <a:t>template &lt;</a:t>
             </a:r>
             <a:r>
               <a:rPr lang="en-US" dirty="0" err="1" smtClean="0"/>
@@ -14250,11 +14238,7 @@
           <a:p>
             <a:r>
               <a:rPr lang="en-US" dirty="0" smtClean="0"/>
-              <a:t>Let’s </a:t>
-            </a:r>
-            <a:r>
-              <a:rPr lang="en-US" dirty="0" smtClean="0"/>
-              <a:t>Build a Toy Spirit X3</a:t>
+              <a:t>Let’s Build a Toy Spirit X3</a:t>
             </a:r>
           </a:p>
           <a:p>
@@ -18245,11 +18229,7 @@
             </a:r>
             <a:r>
               <a:rPr lang="en-US" sz="2000" dirty="0" smtClean="0"/>
-              <a:t>::</a:t>
-            </a:r>
-            <a:r>
-              <a:rPr lang="en-US" sz="2000" dirty="0" smtClean="0"/>
-              <a:t>identity&lt;</a:t>
+              <a:t>::identity&lt;</a:t>
             </a:r>
             <a:r>
               <a:rPr lang="en-US" sz="2000" dirty="0" err="1" smtClean="0"/>
@@ -18637,15 +18617,7 @@
                   <a:schemeClr val="accent4"/>
                 </a:solidFill>
               </a:rPr>
-              <a:t>::</a:t>
-            </a:r>
-            <a:r>
-              <a:rPr lang="en-US" sz="2000" dirty="0" smtClean="0">
-                <a:solidFill>
-                  <a:schemeClr val="accent4"/>
-                </a:solidFill>
-              </a:rPr>
-              <a:t>identity&lt;</a:t>
+              <a:t>::identity&lt;</a:t>
             </a:r>
             <a:r>
               <a:rPr lang="en-US" sz="2000" dirty="0" err="1" smtClean="0">
@@ -20126,6 +20098,12 @@
           </a:p>
           <a:p>
             <a:r>
+              <a:rPr lang="en-US" dirty="0" smtClean="0"/>
+              <a:t>C++11</a:t>
+            </a:r>
+          </a:p>
+          <a:p>
+            <a:r>
               <a:rPr lang="en-US" dirty="0" err="1" smtClean="0"/>
               <a:t>Hackable</a:t>
             </a:r>
@@ -20171,20 +20149,124 @@
           <a:p>
             <a:r>
               <a:rPr lang="en-US" dirty="0" smtClean="0"/>
-              <a:t>Faster compile times</a:t>
+              <a:t>Better error handling</a:t>
             </a:r>
           </a:p>
           <a:p>
             <a:r>
               <a:rPr lang="en-US" dirty="0" smtClean="0"/>
-              <a:t>Better error handling</a:t>
-            </a:r>
-          </a:p>
-          <a:p>
+              <a:t>Faster </a:t>
+            </a:r>
             <a:r>
               <a:rPr lang="en-US" dirty="0" smtClean="0"/>
-              <a:t>C++11</a:t>
-            </a:r>
+              <a:t>compile </a:t>
+            </a:r>
+            <a:r>
+              <a:rPr lang="en-US" dirty="0" smtClean="0"/>
+              <a:t>times</a:t>
+            </a:r>
+            <a:endParaRPr lang="en-US" dirty="0" smtClean="0"/>
+          </a:p>
+        </p:txBody>
+      </p:sp>
+      <p:sp>
+        <p:nvSpPr>
+          <p:cNvPr id="4" name="Rectangle 3"/>
+          <p:cNvSpPr/>
+          <p:nvPr/>
+        </p:nvSpPr>
+        <p:spPr bwMode="auto">
+          <a:xfrm>
+            <a:off x="3886200" y="3733800"/>
+            <a:ext cx="4419600" cy="1219200"/>
+          </a:xfrm>
+          <a:prstGeom prst="rect">
+            <a:avLst/>
+          </a:prstGeom>
+          <a:ln>
+            <a:headEnd type="none" w="med" len="med"/>
+            <a:tailEnd type="none" w="med" len="med"/>
+          </a:ln>
+        </p:spPr>
+        <p:style>
+          <a:lnRef idx="1">
+            <a:schemeClr val="accent2"/>
+          </a:lnRef>
+          <a:fillRef idx="3">
+            <a:schemeClr val="accent2"/>
+          </a:fillRef>
+          <a:effectRef idx="2">
+            <a:schemeClr val="accent2"/>
+          </a:effectRef>
+          <a:fontRef idx="minor">
+            <a:schemeClr val="lt1"/>
+          </a:fontRef>
+        </p:style>
+        <p:txBody>
+          <a:bodyPr vert="horz" wrap="square" lIns="91436" tIns="45718" rIns="91436" bIns="45718" numCol="1" rtlCol="0" anchor="ctr" anchorCtr="0" compatLnSpc="1">
+            <a:prstTxWarp prst="textNoShape">
+              <a:avLst/>
+            </a:prstTxWarp>
+          </a:bodyPr>
+          <a:lstStyle/>
+          <a:p>
+            <a:pPr algn="ctr"/>
+            <a:r>
+              <a:rPr lang="en-US" sz="2800" dirty="0" smtClean="0"/>
+              <a:t>c</a:t>
+            </a:r>
+            <a:r>
+              <a:rPr lang="en-US" sz="2800" dirty="0" smtClean="0"/>
+              <a:t>alc4.cpp example</a:t>
+            </a:r>
+          </a:p>
+          <a:p>
+            <a:pPr algn="ctr"/>
+            <a:r>
+              <a:rPr lang="en-US" sz="2800" dirty="0" smtClean="0"/>
+              <a:t>SpiritX3</a:t>
+            </a:r>
+            <a:r>
+              <a:rPr lang="en-US" sz="2800" dirty="0" smtClean="0"/>
+              <a:t>: TOTAL :   4.27 </a:t>
+            </a:r>
+            <a:r>
+              <a:rPr lang="en-US" sz="2800" dirty="0" err="1" smtClean="0"/>
+              <a:t>secs</a:t>
+            </a:r>
+            <a:endParaRPr lang="en-US" sz="2800" dirty="0" smtClean="0"/>
+          </a:p>
+          <a:p>
+            <a:pPr algn="ctr"/>
+            <a:r>
+              <a:rPr lang="en-US" sz="2800" dirty="0" smtClean="0"/>
+              <a:t>Spirit2</a:t>
+            </a:r>
+            <a:r>
+              <a:rPr lang="en-US" sz="2800" dirty="0" smtClean="0"/>
+              <a:t>:  TOTAL :  10.00 </a:t>
+            </a:r>
+            <a:r>
+              <a:rPr lang="en-US" sz="2800" dirty="0" err="1" smtClean="0"/>
+              <a:t>secs</a:t>
+            </a:r>
+            <a:r>
+              <a:rPr lang="en-US" sz="2800" dirty="0" smtClean="0"/>
+              <a:t> </a:t>
+            </a:r>
+            <a:endParaRPr lang="en-US" sz="2400" dirty="0" smtClean="0">
+              <a:solidFill>
+                <a:srgbClr val="FFFFFF"/>
+              </a:solidFill>
+              <a:effectLst>
+                <a:outerShdw blurRad="38100" dist="38100" dir="2700000" algn="tl">
+                  <a:srgbClr val="000000">
+                    <a:alpha val="43137"/>
+                  </a:srgbClr>
+                </a:outerShdw>
+              </a:effectLst>
+              <a:latin typeface="Segoe" pitchFamily="34" charset="0"/>
+            </a:endParaRPr>
           </a:p>
         </p:txBody>
       </p:sp>
@@ -20199,9 +20281,126 @@
   <p:timing>
     <p:tnLst>
       <p:par>
-        <p:cTn id="1" dur="indefinite" restart="never" nodeType="tmRoot"/>
+        <p:cTn id="1" dur="indefinite" restart="never" nodeType="tmRoot">
+          <p:childTnLst>
+            <p:seq concurrent="1" nextAc="seek">
+              <p:cTn id="2" dur="indefinite" nodeType="mainSeq">
+                <p:childTnLst>
+                  <p:par>
+                    <p:cTn id="3" fill="hold">
+                      <p:stCondLst>
+                        <p:cond delay="indefinite"/>
+                      </p:stCondLst>
+                      <p:childTnLst>
+                        <p:par>
+                          <p:cTn id="4" fill="hold">
+                            <p:stCondLst>
+                              <p:cond delay="0"/>
+                            </p:stCondLst>
+                            <p:childTnLst>
+                              <p:par>
+                                <p:cTn id="5" presetID="2" presetClass="entr" presetSubtype="4" fill="hold" grpId="0" nodeType="clickEffect">
+                                  <p:stCondLst>
+                                    <p:cond delay="0"/>
+                                  </p:stCondLst>
+                                  <p:childTnLst>
+                                    <p:set>
+                                      <p:cBhvr>
+                                        <p:cTn id="6" dur="1" fill="hold">
+                                          <p:stCondLst>
+                                            <p:cond delay="0"/>
+                                          </p:stCondLst>
+                                        </p:cTn>
+                                        <p:tgtEl>
+                                          <p:spTgt spid="4"/>
+                                        </p:tgtEl>
+                                        <p:attrNameLst>
+                                          <p:attrName>style.visibility</p:attrName>
+                                        </p:attrNameLst>
+                                      </p:cBhvr>
+                                      <p:to>
+                                        <p:strVal val="visible"/>
+                                      </p:to>
+                                    </p:set>
+                                    <p:anim calcmode="lin" valueType="num">
+                                      <p:cBhvr additive="base">
+                                        <p:cTn id="7" dur="500" fill="hold"/>
+                                        <p:tgtEl>
+                                          <p:spTgt spid="4"/>
+                                        </p:tgtEl>
+                                        <p:attrNameLst>
+                                          <p:attrName>ppt_x</p:attrName>
+                                        </p:attrNameLst>
+                                      </p:cBhvr>
+                                      <p:tavLst>
+                                        <p:tav tm="0">
+                                          <p:val>
+                                            <p:strVal val="#ppt_x"/>
+                                          </p:val>
+                                        </p:tav>
+                                        <p:tav tm="100000">
+                                          <p:val>
+                                            <p:strVal val="#ppt_x"/>
+                                          </p:val>
+                                        </p:tav>
+                                      </p:tavLst>
+                                    </p:anim>
+                                    <p:anim calcmode="lin" valueType="num">
+                                      <p:cBhvr additive="base">
+                                        <p:cTn id="8" dur="500" fill="hold"/>
+                                        <p:tgtEl>
+                                          <p:spTgt spid="4"/>
+                                        </p:tgtEl>
+                                        <p:attrNameLst>
+                                          <p:attrName>ppt_y</p:attrName>
+                                        </p:attrNameLst>
+                                      </p:cBhvr>
+                                      <p:tavLst>
+                                        <p:tav tm="0">
+                                          <p:val>
+                                            <p:strVal val="1+#ppt_h/2"/>
+                                          </p:val>
+                                        </p:tav>
+                                        <p:tav tm="100000">
+                                          <p:val>
+                                            <p:strVal val="#ppt_y"/>
+                                          </p:val>
+                                        </p:tav>
+                                      </p:tavLst>
+                                    </p:anim>
+                                  </p:childTnLst>
+                                </p:cTn>
+                              </p:par>
+                            </p:childTnLst>
+                          </p:cTn>
+                        </p:par>
+                      </p:childTnLst>
+                    </p:cTn>
+                  </p:par>
+                </p:childTnLst>
+              </p:cTn>
+              <p:prevCondLst>
+                <p:cond evt="onPrev" delay="0">
+                  <p:tgtEl>
+                    <p:sldTgt/>
+                  </p:tgtEl>
+                </p:cond>
+              </p:prevCondLst>
+              <p:nextCondLst>
+                <p:cond evt="onNext" delay="0">
+                  <p:tgtEl>
+                    <p:sldTgt/>
+                  </p:tgtEl>
+                </p:cond>
+              </p:nextCondLst>
+            </p:seq>
+          </p:childTnLst>
+        </p:cTn>
       </p:par>
     </p:tnLst>
+    <p:bldLst>
+      <p:bldP spid="4" grpId="0" animBg="1"/>
+    </p:bldLst>
   </p:timing>
 </p:sld>
 </file>
@@ -21849,27 +22048,7 @@
             <a:pPr lvl="1"/>
             <a:r>
               <a:rPr lang="en-US" sz="2000" dirty="0" smtClean="0"/>
-              <a:t>a -&gt; </a:t>
-            </a:r>
-            <a:r>
-              <a:rPr lang="en-US" sz="2000" dirty="0" smtClean="0"/>
-              <a:t>T</a:t>
-            </a:r>
-            <a:r>
-              <a:rPr lang="en-US" sz="2000" dirty="0" smtClean="0"/>
-              <a:t>, </a:t>
-            </a:r>
-            <a:r>
-              <a:rPr lang="en-US" sz="2000" dirty="0" smtClean="0"/>
-              <a:t>b -&gt; </a:t>
-            </a:r>
-            <a:r>
-              <a:rPr lang="en-US" sz="2000" dirty="0" smtClean="0"/>
-              <a:t>U </a:t>
-            </a:r>
-            <a:r>
-              <a:rPr lang="en-US" sz="2000" dirty="0" smtClean="0"/>
-              <a:t>	 	→ 	(a &gt;&gt; b) -&gt; </a:t>
+              <a:t>a -&gt; T, b -&gt; U 	 	→ 	(a &gt;&gt; b) -&gt; </a:t>
             </a:r>
             <a:r>
               <a:rPr lang="en-US" sz="2000" dirty="0" err="1" smtClean="0"/>
@@ -21877,19 +22056,7 @@
             </a:r>
             <a:r>
               <a:rPr lang="en-US" sz="2000" dirty="0" smtClean="0"/>
-              <a:t>&lt;T, </a:t>
-            </a:r>
-            <a:r>
-              <a:rPr lang="en-US" sz="2000" dirty="0" smtClean="0"/>
-              <a:t>U</a:t>
-            </a:r>
-            <a:r>
-              <a:rPr lang="en-US" sz="2000" dirty="0" smtClean="0"/>
-              <a:t>&gt;</a:t>
-            </a:r>
-            <a:r>
-              <a:rPr lang="en-US" sz="2000" dirty="0" smtClean="0"/>
-              <a:t/>
+              <a:t>&lt;T, U&gt;</a:t>
             </a:r>
             <a:br>
               <a:rPr lang="en-US" sz="2000" dirty="0" smtClean="0"/>
@@ -21906,79 +22073,21 @@
             <a:pPr lvl="1"/>
             <a:r>
               <a:rPr lang="en-US" sz="2000" dirty="0" smtClean="0"/>
-              <a:t>a</a:t>
-            </a:r>
-            <a:r>
-              <a:rPr lang="en-US" sz="2000" dirty="0" smtClean="0"/>
-              <a:t> -&gt; T, b -&gt;unused</a:t>
-            </a:r>
-            <a:r>
-              <a:rPr lang="en-US" sz="2000" dirty="0" smtClean="0"/>
-              <a:t>	</a:t>
-            </a:r>
-            <a:r>
-              <a:rPr lang="en-US" sz="2000" dirty="0" smtClean="0"/>
-              <a:t>	→</a:t>
-            </a:r>
-            <a:r>
-              <a:rPr lang="en-US" sz="2000" dirty="0" smtClean="0"/>
-              <a:t>	</a:t>
-            </a:r>
-            <a:r>
-              <a:rPr lang="en-US" sz="2000" dirty="0" smtClean="0"/>
-              <a:t>T</a:t>
-            </a:r>
-            <a:endParaRPr lang="en-US" sz="2000" dirty="0" smtClean="0"/>
+              <a:t>a -&gt; T, b -&gt;unused		→	T</a:t>
+            </a:r>
           </a:p>
           <a:p>
             <a:pPr lvl="1"/>
             <a:r>
               <a:rPr lang="en-US" sz="2000" dirty="0" smtClean="0"/>
-              <a:t>a</a:t>
-            </a:r>
-            <a:r>
-              <a:rPr lang="en-US" sz="2000" dirty="0" smtClean="0"/>
-              <a:t> -&gt; unused</a:t>
-            </a:r>
-            <a:r>
-              <a:rPr lang="en-US" sz="2000" dirty="0" smtClean="0"/>
-              <a:t>, </a:t>
-            </a:r>
-            <a:r>
-              <a:rPr lang="en-US" sz="2000" dirty="0" smtClean="0"/>
-              <a:t>b -&gt;U</a:t>
-            </a:r>
-            <a:r>
-              <a:rPr lang="en-US" sz="2000" dirty="0" smtClean="0"/>
-              <a:t>	</a:t>
-            </a:r>
-            <a:r>
-              <a:rPr lang="en-US" sz="2000" dirty="0" smtClean="0"/>
-              <a:t>→</a:t>
-            </a:r>
-            <a:r>
-              <a:rPr lang="en-US" sz="2000" dirty="0" smtClean="0"/>
-              <a:t>	</a:t>
-            </a:r>
-            <a:r>
-              <a:rPr lang="en-US" sz="2000" dirty="0" smtClean="0"/>
-              <a:t>U</a:t>
-            </a:r>
-            <a:endParaRPr lang="en-US" sz="2000" dirty="0" smtClean="0"/>
+              <a:t>a -&gt; unused, b -&gt;U	→	U</a:t>
+            </a:r>
           </a:p>
           <a:p>
             <a:pPr lvl="1"/>
             <a:r>
               <a:rPr lang="en-US" sz="2000" dirty="0" smtClean="0"/>
-              <a:t>a</a:t>
-            </a:r>
-            <a:r>
-              <a:rPr lang="en-US" sz="2000" dirty="0" smtClean="0"/>
-              <a:t> -&gt; unused, b -&gt;unused</a:t>
-            </a:r>
-            <a:r>
-              <a:rPr lang="en-US" sz="2000" dirty="0" smtClean="0"/>
-              <a:t>	→	unused</a:t>
+              <a:t>a -&gt; unused, b -&gt;unused	→	unused</a:t>
             </a:r>
             <a:br>
               <a:rPr lang="en-US" sz="2000" dirty="0" smtClean="0"/>
@@ -21995,39 +22104,15 @@
             <a:pPr lvl="1"/>
             <a:r>
               <a:rPr lang="pt-BR" sz="2000" dirty="0" smtClean="0"/>
-              <a:t>(a &gt;&gt; b) := </a:t>
+              <a:t>(a &gt;&gt; b) := vector&lt;T&gt;	</a:t>
+            </a:r>
+            <a:r>
+              <a:rPr lang="en-US" sz="2000" dirty="0" smtClean="0"/>
+              <a:t>→	</a:t>
             </a:r>
             <a:r>
               <a:rPr lang="pt-BR" sz="2000" dirty="0" smtClean="0"/>
-              <a:t>vector&lt;T&gt;</a:t>
-            </a:r>
-            <a:r>
-              <a:rPr lang="pt-BR" sz="2000" dirty="0" smtClean="0"/>
-              <a:t>	</a:t>
-            </a:r>
-            <a:r>
-              <a:rPr lang="en-US" sz="2000" dirty="0" smtClean="0"/>
-              <a:t>→	</a:t>
-            </a:r>
-            <a:r>
-              <a:rPr lang="pt-BR" sz="2000" dirty="0" smtClean="0"/>
-              <a:t>a := </a:t>
-            </a:r>
-            <a:r>
-              <a:rPr lang="pt-BR" sz="2000" dirty="0" smtClean="0"/>
-              <a:t>T, </a:t>
-            </a:r>
-            <a:r>
-              <a:rPr lang="pt-BR" sz="2000" dirty="0" smtClean="0"/>
-              <a:t>b := </a:t>
-            </a:r>
-            <a:r>
-              <a:rPr lang="pt-BR" sz="2000" dirty="0" smtClean="0"/>
-              <a:t>T </a:t>
-            </a:r>
-            <a:r>
-              <a:rPr lang="pt-BR" sz="2000" dirty="0" smtClean="0"/>
-              <a:t/>
+              <a:t>a := T, b := T </a:t>
             </a:r>
             <a:br>
               <a:rPr lang="pt-BR" sz="2000" dirty="0" smtClean="0"/>
@@ -22050,19 +22135,7 @@
             </a:r>
             <a:r>
               <a:rPr lang="pt-BR" sz="2000" dirty="0" smtClean="0"/>
-              <a:t>vector&lt;T&gt;, </a:t>
-            </a:r>
-            <a:r>
-              <a:rPr lang="pt-BR" sz="2000" dirty="0" smtClean="0"/>
-              <a:t>b := </a:t>
-            </a:r>
-            <a:r>
-              <a:rPr lang="pt-BR" sz="2000" dirty="0" smtClean="0"/>
-              <a:t>T</a:t>
-            </a:r>
-            <a:r>
-              <a:rPr lang="pt-BR" sz="2000" dirty="0" smtClean="0"/>
-              <a:t/>
+              <a:t>vector&lt;T&gt;, b := T</a:t>
             </a:r>
             <a:br>
               <a:rPr lang="pt-BR" sz="2000" dirty="0" smtClean="0"/>
@@ -22077,23 +22150,7 @@
             </a:r>
             <a:r>
               <a:rPr lang="pt-BR" sz="2000" dirty="0" smtClean="0"/>
-              <a:t>a := </a:t>
-            </a:r>
-            <a:r>
-              <a:rPr lang="pt-BR" sz="2000" dirty="0" smtClean="0"/>
-              <a:t>T, </a:t>
-            </a:r>
-            <a:r>
-              <a:rPr lang="pt-BR" sz="2000" dirty="0" smtClean="0"/>
-              <a:t>b := </a:t>
-            </a:r>
-            <a:r>
-              <a:rPr lang="pt-BR" sz="2000" dirty="0" smtClean="0"/>
-              <a:t>vector&lt;T&gt;</a:t>
-            </a:r>
-            <a:r>
-              <a:rPr lang="pt-BR" sz="2000" dirty="0" smtClean="0"/>
-              <a:t/>
+              <a:t>a := T, b := vector&lt;T&gt;</a:t>
             </a:r>
             <a:br>
               <a:rPr lang="pt-BR" sz="2000" dirty="0" smtClean="0"/>
@@ -22108,21 +22165,8 @@
             </a:r>
             <a:r>
               <a:rPr lang="pt-BR" sz="2000" dirty="0" smtClean="0"/>
-              <a:t>a := </a:t>
-            </a:r>
-            <a:r>
-              <a:rPr lang="pt-BR" sz="2000" dirty="0" smtClean="0"/>
-              <a:t>vector&lt;T&gt;, </a:t>
-            </a:r>
-            <a:r>
-              <a:rPr lang="pt-BR" sz="2000" dirty="0" smtClean="0"/>
-              <a:t>b := </a:t>
-            </a:r>
-            <a:r>
-              <a:rPr lang="pt-BR" sz="2000" dirty="0" smtClean="0"/>
-              <a:t>vector&lt;T&gt; </a:t>
-            </a:r>
-            <a:endParaRPr lang="pt-BR" sz="2000" dirty="0" smtClean="0"/>
+              <a:t>a := vector&lt;T&gt;, b := vector&lt;T&gt; </a:t>
+            </a:r>
           </a:p>
         </p:txBody>
       </p:sp>
@@ -35266,15 +35310,7 @@
             </a:r>
             <a:r>
               <a:rPr lang="en-US" sz="2000" dirty="0" smtClean="0"/>
-              <a:t> (</a:t>
-            </a:r>
-            <a:r>
-              <a:rPr lang="en-US" sz="2000" dirty="0" smtClean="0"/>
-              <a:t>factor, </a:t>
-            </a:r>
-            <a:r>
-              <a:rPr lang="en-US" sz="2000" dirty="0" smtClean="0"/>
-              <a:t>term, </a:t>
+              <a:t> (factor, term, </a:t>
             </a:r>
             <a:r>
               <a:rPr lang="en-US" sz="2000" dirty="0" err="1" smtClean="0"/>
@@ -35324,11 +35360,7 @@
             </a:r>
             <a:r>
               <a:rPr lang="en-US" sz="2000" dirty="0" smtClean="0"/>
-              <a:t>(); </a:t>
-            </a:r>
-            <a:r>
-              <a:rPr lang="en-US" sz="2000" dirty="0" smtClean="0"/>
-              <a:t>}</a:t>
+              <a:t>(); }</a:t>
             </a:r>
             <a:endParaRPr lang="en-US" sz="2000" dirty="0"/>
           </a:p>
@@ -46843,11 +46875,7 @@
             </a:pPr>
             <a:r>
               <a:rPr lang="en-US" sz="2800" dirty="0" smtClean="0"/>
-              <a:t>factor   </a:t>
-            </a:r>
-            <a:r>
-              <a:rPr lang="en-US" sz="2800" dirty="0" smtClean="0"/>
-              <a:t>	←   	integer   /  '('   </a:t>
+              <a:t>factor   	←   	integer   /  '('   </a:t>
             </a:r>
             <a:r>
               <a:rPr lang="en-US" sz="2800" dirty="0" err="1" smtClean="0"/>
@@ -46864,37 +46892,8 @@
             </a:pPr>
             <a:r>
               <a:rPr lang="en-US" sz="2800" dirty="0" smtClean="0"/>
-              <a:t>term 	</a:t>
-            </a:r>
-            <a:r>
-              <a:rPr lang="en-US" sz="2800" dirty="0" smtClean="0"/>
-              <a:t>	←   </a:t>
-            </a:r>
-            <a:r>
-              <a:rPr lang="en-US" sz="2800" dirty="0" smtClean="0"/>
-              <a:t>	</a:t>
-            </a:r>
-            <a:r>
-              <a:rPr lang="en-US" sz="2800" dirty="0" smtClean="0"/>
-              <a:t>factor </a:t>
-            </a:r>
-            <a:r>
-              <a:rPr lang="en-US" sz="2800" dirty="0" smtClean="0"/>
-              <a:t>(('*'   </a:t>
-            </a:r>
-            <a:r>
-              <a:rPr lang="en-US" sz="2800" dirty="0" smtClean="0"/>
-              <a:t>factor)  </a:t>
-            </a:r>
-            <a:r>
-              <a:rPr lang="en-US" sz="2800" dirty="0" smtClean="0"/>
-              <a:t>/  ('/'   </a:t>
-            </a:r>
-            <a:r>
-              <a:rPr lang="en-US" sz="2800" dirty="0" smtClean="0"/>
-              <a:t>factor))*</a:t>
-            </a:r>
-            <a:endParaRPr lang="en-US" sz="2800" dirty="0" smtClean="0"/>
+              <a:t>term 		←   	factor (('*'   factor)  /  ('/'   factor))*</a:t>
+            </a:r>
           </a:p>
           <a:p>
             <a:pPr>
@@ -46906,15 +46905,7 @@
             </a:r>
             <a:r>
               <a:rPr lang="en-US" sz="2800" dirty="0" smtClean="0"/>
-              <a:t> 	</a:t>
-            </a:r>
-            <a:r>
-              <a:rPr lang="en-US" sz="2800" dirty="0" smtClean="0"/>
-              <a:t>	←   </a:t>
-            </a:r>
-            <a:r>
-              <a:rPr lang="en-US" sz="2800" dirty="0" smtClean="0"/>
-              <a:t>	term (('+' term)  /  ('-'   term))*</a:t>
+              <a:t> 		←   	term (('+' term)  /  ('-'   term))*</a:t>
             </a:r>
           </a:p>
           <a:p>

</xml_diff>